<commit_message>
Added Comments in code and Modify the Presentation
</commit_message>
<xml_diff>
--- a/Presentation_LEDMatrix.pptx
+++ b/Presentation_LEDMatrix.pptx
@@ -5,10 +5,10 @@
     <p:sldMasterId id="2147483649" r:id="rId1"/>
   </p:sldMasterIdLst>
   <p:notesMasterIdLst>
-    <p:notesMasterId r:id="rId13"/>
+    <p:notesMasterId r:id="rId14"/>
   </p:notesMasterIdLst>
   <p:handoutMasterIdLst>
-    <p:handoutMasterId r:id="rId14"/>
+    <p:handoutMasterId r:id="rId15"/>
   </p:handoutMasterIdLst>
   <p:sldIdLst>
     <p:sldId id="256" r:id="rId2"/>
@@ -19,9 +19,10 @@
     <p:sldId id="417" r:id="rId7"/>
     <p:sldId id="419" r:id="rId8"/>
     <p:sldId id="420" r:id="rId9"/>
-    <p:sldId id="421" r:id="rId10"/>
-    <p:sldId id="422" r:id="rId11"/>
-    <p:sldId id="414" r:id="rId12"/>
+    <p:sldId id="422" r:id="rId10"/>
+    <p:sldId id="421" r:id="rId11"/>
+    <p:sldId id="423" r:id="rId12"/>
+    <p:sldId id="414" r:id="rId13"/>
   </p:sldIdLst>
   <p:sldSz cx="9144000" cy="6858000" type="screen4x3"/>
   <p:notesSz cx="6646863" cy="9777413"/>
@@ -1332,7 +1333,7 @@
                 <a:buNone/>
                 <a:defRPr/>
               </a:pPr>
-              <a:t>10-05-20</a:t>
+              <a:t>13-05-20</a:t>
             </a:fld>
             <a:endParaRPr lang="en-US" sz="1400" dirty="0">
               <a:solidFill>
@@ -5382,7 +5383,7 @@
           <p:cNvPr id="2" name="Title 1">
             <a:extLst>
               <a:ext uri="{FF2B5EF4-FFF2-40B4-BE49-F238E27FC236}">
-                <a16:creationId xmlns:a16="http://schemas.microsoft.com/office/drawing/2014/main" id="{B9BC88A8-1215-4842-9008-791129A189D2}"/>
+                <a16:creationId xmlns:a16="http://schemas.microsoft.com/office/drawing/2014/main" id="{1C425CC9-6AB3-46AF-B088-CE31185D5114}"/>
               </a:ext>
             </a:extLst>
           </p:cNvPr>
@@ -5400,17 +5401,17 @@
           <a:p>
             <a:r>
               <a:rPr lang="en-US" dirty="0"/>
-              <a:t>Application</a:t>
+              <a:t>Testbench</a:t>
             </a:r>
           </a:p>
         </p:txBody>
       </p:sp>
       <p:pic>
         <p:nvPicPr>
-          <p:cNvPr id="8" name="Content Placeholder 7">
+          <p:cNvPr id="7" name="Content Placeholder 6">
             <a:extLst>
               <a:ext uri="{FF2B5EF4-FFF2-40B4-BE49-F238E27FC236}">
-                <a16:creationId xmlns:a16="http://schemas.microsoft.com/office/drawing/2014/main" id="{C557F22E-6069-4A3F-9FE3-4B518DEACDED}"/>
+                <a16:creationId xmlns:a16="http://schemas.microsoft.com/office/drawing/2014/main" id="{3C8173AC-F959-4BB1-87DE-51678896635E}"/>
               </a:ext>
             </a:extLst>
           </p:cNvPr>
@@ -5429,8 +5430,8 @@
         </p:blipFill>
         <p:spPr>
           <a:xfrm>
-            <a:off x="0" y="938372"/>
-            <a:ext cx="4648200" cy="5064739"/>
+            <a:off x="158386" y="1113847"/>
+            <a:ext cx="8827228" cy="915749"/>
           </a:xfrm>
           <a:prstGeom prst="rect">
             <a:avLst/>
@@ -5442,7 +5443,7 @@
           <p:cNvPr id="5" name="Slide Number Placeholder 4">
             <a:extLst>
               <a:ext uri="{FF2B5EF4-FFF2-40B4-BE49-F238E27FC236}">
-                <a16:creationId xmlns:a16="http://schemas.microsoft.com/office/drawing/2014/main" id="{EC802190-4DC8-49B6-B333-0198AC60F408}"/>
+                <a16:creationId xmlns:a16="http://schemas.microsoft.com/office/drawing/2014/main" id="{E5052012-D434-4515-A05A-5B1533CEC4DF}"/>
               </a:ext>
             </a:extLst>
           </p:cNvPr>
@@ -5477,7 +5478,7 @@
           <p:cNvPr id="6" name="Footer Placeholder 5">
             <a:extLst>
               <a:ext uri="{FF2B5EF4-FFF2-40B4-BE49-F238E27FC236}">
-                <a16:creationId xmlns:a16="http://schemas.microsoft.com/office/drawing/2014/main" id="{E03D21CF-AA7B-46FB-B404-5261F34C506A}"/>
+                <a16:creationId xmlns:a16="http://schemas.microsoft.com/office/drawing/2014/main" id="{9D157A7C-9D5B-402E-AD60-D5C89BD887F4}"/>
               </a:ext>
             </a:extLst>
           </p:cNvPr>
@@ -5503,72 +5504,94 @@
           </a:p>
         </p:txBody>
       </p:sp>
-      <p:sp>
-        <p:nvSpPr>
-          <p:cNvPr id="7" name="Content Placeholder 3">
+      <p:pic>
+        <p:nvPicPr>
+          <p:cNvPr id="8" name="Picture 7">
             <a:extLst>
               <a:ext uri="{FF2B5EF4-FFF2-40B4-BE49-F238E27FC236}">
-                <a16:creationId xmlns:a16="http://schemas.microsoft.com/office/drawing/2014/main" id="{427C1B57-3A60-4A62-9EF3-DE4162FD1CB8}"/>
+                <a16:creationId xmlns:a16="http://schemas.microsoft.com/office/drawing/2014/main" id="{085AAD7F-A04E-436C-A15B-2074AF0035FF}"/>
               </a:ext>
             </a:extLst>
           </p:cNvPr>
-          <p:cNvSpPr>
-            <a:spLocks noGrp="1"/>
-          </p:cNvSpPr>
-          <p:nvPr>
-            <p:ph sz="half" idx="2"/>
-          </p:nvPr>
-        </p:nvSpPr>
+          <p:cNvPicPr>
+            <a:picLocks noChangeAspect="1"/>
+          </p:cNvPicPr>
+          <p:nvPr/>
+        </p:nvPicPr>
+        <p:blipFill>
+          <a:blip r:embed="rId3"/>
+          <a:stretch>
+            <a:fillRect/>
+          </a:stretch>
+        </p:blipFill>
         <p:spPr>
           <a:xfrm>
-            <a:off x="4880213" y="1901391"/>
-            <a:ext cx="4248472" cy="3138700"/>
+            <a:off x="174477" y="2255466"/>
+            <a:ext cx="3970469" cy="3762953"/>
+          </a:xfrm>
+          <a:prstGeom prst="rect">
+            <a:avLst/>
+          </a:prstGeom>
+        </p:spPr>
+      </p:pic>
+      <p:sp>
+        <p:nvSpPr>
+          <p:cNvPr id="12" name="Content Placeholder 11">
+            <a:extLst>
+              <a:ext uri="{FF2B5EF4-FFF2-40B4-BE49-F238E27FC236}">
+                <a16:creationId xmlns:a16="http://schemas.microsoft.com/office/drawing/2014/main" id="{0003DC4E-DD2C-4D75-B15D-BD99ECC5F7C4}"/>
+              </a:ext>
+            </a:extLst>
+          </p:cNvPr>
+          <p:cNvSpPr>
+            <a:spLocks noGrp="1"/>
+          </p:cNvSpPr>
+          <p:nvPr>
+            <p:ph sz="half" idx="2"/>
+          </p:nvPr>
+        </p:nvSpPr>
+        <p:spPr>
+          <a:xfrm>
+            <a:off x="4659313" y="2132856"/>
+            <a:ext cx="4038600" cy="3932982"/>
           </a:xfrm>
         </p:spPr>
         <p:txBody>
           <a:bodyPr/>
           <a:lstStyle/>
           <a:p>
-            <a:pPr marL="457200" lvl="1" indent="0">
-              <a:buNone/>
-            </a:pPr>
             <a:r>
               <a:rPr lang="en-US" sz="2000" dirty="0"/>
-              <a:t>The first 4 bits are never used for this device. </a:t>
-            </a:r>
-          </a:p>
-          <a:p>
-            <a:pPr marL="457200" lvl="1" indent="0">
-              <a:buNone/>
-            </a:pPr>
+              <a:t>The frame chosen contains 16 bits and represent one initialization frame of data frame for the matrix.</a:t>
+            </a:r>
+          </a:p>
+          <a:p>
+            <a:endParaRPr lang="en-US" sz="2000" dirty="0"/>
+          </a:p>
+          <a:p>
             <a:r>
               <a:rPr lang="en-US" sz="2000" dirty="0"/>
-              <a:t>The last 8 bits each monitor one led in the line. </a:t>
-            </a:r>
-          </a:p>
-          <a:p>
-            <a:pPr marL="457200" lvl="1" indent="0">
-              <a:buNone/>
-            </a:pPr>
+              <a:t>CS comes to zero -&gt; Data start its duty cycle</a:t>
+            </a:r>
+          </a:p>
+          <a:p>
+            <a:endParaRPr lang="en-US" sz="2000" dirty="0"/>
+          </a:p>
+          <a:p>
             <a:r>
               <a:rPr lang="en-US" sz="2000" dirty="0"/>
-              <a:t>If the bits are equal to 1, the corresponding LEDs will be lit and in the same way, they will be off if the bits are equal to 0. </a:t>
-            </a:r>
-          </a:p>
-          <a:p>
-            <a:pPr lvl="1"/>
-            <a:endParaRPr lang="es-MX" dirty="0"/>
-          </a:p>
-          <a:p>
-            <a:pPr lvl="1"/>
-            <a:endParaRPr lang="en-US" dirty="0"/>
+              <a:t>We can see that the data waveform is the same as the data frame</a:t>
+            </a:r>
+          </a:p>
+          <a:p>
+            <a:endParaRPr lang="en-US" sz="2000" dirty="0"/>
           </a:p>
         </p:txBody>
       </p:sp>
     </p:spTree>
     <p:extLst>
       <p:ext uri="{BB962C8B-B14F-4D97-AF65-F5344CB8AC3E}">
-        <p14:creationId xmlns:p14="http://schemas.microsoft.com/office/powerpoint/2010/main" val="4010572043"/>
+        <p14:creationId xmlns:p14="http://schemas.microsoft.com/office/powerpoint/2010/main" val="2305922971"/>
       </p:ext>
     </p:extLst>
   </p:cSld>
@@ -5600,6 +5623,180 @@
           <p:cNvPr id="2" name="Title 1">
             <a:extLst>
               <a:ext uri="{FF2B5EF4-FFF2-40B4-BE49-F238E27FC236}">
+                <a16:creationId xmlns:a16="http://schemas.microsoft.com/office/drawing/2014/main" id="{2CE4BDF1-7F04-4DEC-843E-2A3B91BA12BF}"/>
+              </a:ext>
+            </a:extLst>
+          </p:cNvPr>
+          <p:cNvSpPr>
+            <a:spLocks noGrp="1"/>
+          </p:cNvSpPr>
+          <p:nvPr>
+            <p:ph type="title"/>
+          </p:nvPr>
+        </p:nvSpPr>
+        <p:spPr/>
+        <p:txBody>
+          <a:bodyPr/>
+          <a:lstStyle/>
+          <a:p>
+            <a:r>
+              <a:rPr lang="en-US" dirty="0"/>
+              <a:t>Conclusion</a:t>
+            </a:r>
+          </a:p>
+        </p:txBody>
+      </p:sp>
+      <p:sp>
+        <p:nvSpPr>
+          <p:cNvPr id="3" name="Content Placeholder 2">
+            <a:extLst>
+              <a:ext uri="{FF2B5EF4-FFF2-40B4-BE49-F238E27FC236}">
+                <a16:creationId xmlns:a16="http://schemas.microsoft.com/office/drawing/2014/main" id="{4E140F48-B801-4325-9A4A-A9CE352102A9}"/>
+              </a:ext>
+            </a:extLst>
+          </p:cNvPr>
+          <p:cNvSpPr>
+            <a:spLocks noGrp="1"/>
+          </p:cNvSpPr>
+          <p:nvPr>
+            <p:ph sz="half" idx="1"/>
+          </p:nvPr>
+        </p:nvSpPr>
+        <p:spPr/>
+        <p:txBody>
+          <a:bodyPr/>
+          <a:lstStyle/>
+          <a:p>
+            <a:endParaRPr lang="en-US"/>
+          </a:p>
+        </p:txBody>
+      </p:sp>
+      <p:sp>
+        <p:nvSpPr>
+          <p:cNvPr id="4" name="Content Placeholder 3">
+            <a:extLst>
+              <a:ext uri="{FF2B5EF4-FFF2-40B4-BE49-F238E27FC236}">
+                <a16:creationId xmlns:a16="http://schemas.microsoft.com/office/drawing/2014/main" id="{3ECD01BC-D983-4D1D-9682-D1380B191560}"/>
+              </a:ext>
+            </a:extLst>
+          </p:cNvPr>
+          <p:cNvSpPr>
+            <a:spLocks noGrp="1"/>
+          </p:cNvSpPr>
+          <p:nvPr>
+            <p:ph sz="half" idx="2"/>
+          </p:nvPr>
+        </p:nvSpPr>
+        <p:spPr/>
+        <p:txBody>
+          <a:bodyPr/>
+          <a:lstStyle/>
+          <a:p>
+            <a:endParaRPr lang="en-US"/>
+          </a:p>
+        </p:txBody>
+      </p:sp>
+      <p:sp>
+        <p:nvSpPr>
+          <p:cNvPr id="5" name="Slide Number Placeholder 4">
+            <a:extLst>
+              <a:ext uri="{FF2B5EF4-FFF2-40B4-BE49-F238E27FC236}">
+                <a16:creationId xmlns:a16="http://schemas.microsoft.com/office/drawing/2014/main" id="{E2669424-6BC6-4065-A642-9E07584DF98B}"/>
+              </a:ext>
+            </a:extLst>
+          </p:cNvPr>
+          <p:cNvSpPr>
+            <a:spLocks noGrp="1"/>
+          </p:cNvSpPr>
+          <p:nvPr>
+            <p:ph type="sldNum" sz="quarter" idx="10"/>
+          </p:nvPr>
+        </p:nvSpPr>
+        <p:spPr/>
+        <p:txBody>
+          <a:bodyPr/>
+          <a:lstStyle/>
+          <a:p>
+            <a:pPr>
+              <a:defRPr/>
+            </a:pPr>
+            <a:fld id="{814E4D95-5749-4317-9CDB-71B0D5CB6843}" type="slidenum">
+              <a:rPr lang="en-US" smtClean="0"/>
+              <a:pPr>
+                <a:defRPr/>
+              </a:pPr>
+              <a:t>11</a:t>
+            </a:fld>
+            <a:endParaRPr lang="en-US" dirty="0"/>
+          </a:p>
+        </p:txBody>
+      </p:sp>
+      <p:sp>
+        <p:nvSpPr>
+          <p:cNvPr id="6" name="Footer Placeholder 5">
+            <a:extLst>
+              <a:ext uri="{FF2B5EF4-FFF2-40B4-BE49-F238E27FC236}">
+                <a16:creationId xmlns:a16="http://schemas.microsoft.com/office/drawing/2014/main" id="{D29F281E-5F91-45E6-A024-264D0676F7A7}"/>
+              </a:ext>
+            </a:extLst>
+          </p:cNvPr>
+          <p:cNvSpPr>
+            <a:spLocks noGrp="1"/>
+          </p:cNvSpPr>
+          <p:nvPr>
+            <p:ph type="ftr" sz="quarter" idx="11"/>
+          </p:nvPr>
+        </p:nvSpPr>
+        <p:spPr/>
+        <p:txBody>
+          <a:bodyPr/>
+          <a:lstStyle/>
+          <a:p>
+            <a:pPr>
+              <a:defRPr/>
+            </a:pPr>
+            <a:r>
+              <a:rPr lang="fr-FR"/>
+              <a:t>1009-05 Systèmes à Microprocesseur 1. Structure ordinateur</a:t>
+            </a:r>
+          </a:p>
+        </p:txBody>
+      </p:sp>
+    </p:spTree>
+    <p:extLst>
+      <p:ext uri="{BB962C8B-B14F-4D97-AF65-F5344CB8AC3E}">
+        <p14:creationId xmlns:p14="http://schemas.microsoft.com/office/powerpoint/2010/main" val="1888185302"/>
+      </p:ext>
+    </p:extLst>
+  </p:cSld>
+  <p:clrMapOvr>
+    <a:masterClrMapping/>
+  </p:clrMapOvr>
+</p:sld>
+</file>
+
+<file path=ppt/slides/slide12.xml><?xml version="1.0" encoding="utf-8"?>
+<p:sld xmlns:a="http://schemas.openxmlformats.org/drawingml/2006/main" xmlns:r="http://schemas.openxmlformats.org/officeDocument/2006/relationships" xmlns:p="http://schemas.openxmlformats.org/presentationml/2006/main">
+  <p:cSld>
+    <p:spTree>
+      <p:nvGrpSpPr>
+        <p:cNvPr id="1" name=""/>
+        <p:cNvGrpSpPr/>
+        <p:nvPr/>
+      </p:nvGrpSpPr>
+      <p:grpSpPr>
+        <a:xfrm>
+          <a:off x="0" y="0"/>
+          <a:ext cx="0" cy="0"/>
+          <a:chOff x="0" y="0"/>
+          <a:chExt cx="0" cy="0"/>
+        </a:xfrm>
+      </p:grpSpPr>
+      <p:sp>
+        <p:nvSpPr>
+          <p:cNvPr id="2" name="Title 1">
+            <a:extLst>
+              <a:ext uri="{FF2B5EF4-FFF2-40B4-BE49-F238E27FC236}">
                 <a16:creationId xmlns:a16="http://schemas.microsoft.com/office/drawing/2014/main" id="{909E8B68-355B-486B-ACA4-386B76CA9955}"/>
               </a:ext>
             </a:extLst>
@@ -5644,6 +5841,39 @@
           <a:bodyPr/>
           <a:lstStyle/>
           <a:p>
+            <a:r>
+              <a:rPr lang="en-US" dirty="0"/>
+              <a:t>GitHub Link</a:t>
+            </a:r>
+          </a:p>
+          <a:p>
+            <a:pPr lvl="1"/>
+            <a:r>
+              <a:rPr lang="en-US" dirty="0">
+                <a:hlinkClick r:id="rId2"/>
+              </a:rPr>
+              <a:t>https://github.com/CharlyTQ/Max7219_Tutorial_FPGA</a:t>
+            </a:r>
+            <a:endParaRPr lang="en-US" dirty="0"/>
+          </a:p>
+          <a:p>
+            <a:pPr lvl="1"/>
+            <a:endParaRPr lang="en-US" dirty="0"/>
+          </a:p>
+          <a:p>
+            <a:r>
+              <a:rPr lang="en-US" dirty="0"/>
+              <a:t>Altera Quartus Software Link</a:t>
+            </a:r>
+          </a:p>
+          <a:p>
+            <a:pPr lvl="1"/>
+            <a:r>
+              <a:rPr lang="en-US" dirty="0">
+                <a:hlinkClick r:id="rId3"/>
+              </a:rPr>
+              <a:t>https://fpgasoftware.intel.com/?edition=lite</a:t>
+            </a:r>
             <a:endParaRPr lang="en-US" dirty="0"/>
           </a:p>
         </p:txBody>
@@ -5677,7 +5907,7 @@
               <a:pPr>
                 <a:defRPr/>
               </a:pPr>
-              <a:t>11</a:t>
+              <a:t>12</a:t>
             </a:fld>
             <a:endParaRPr lang="en-US" dirty="0"/>
           </a:p>
@@ -5813,7 +6043,7 @@
         <p:spPr>
           <a:xfrm>
             <a:off x="215516" y="908720"/>
-            <a:ext cx="8712968" cy="5262979"/>
+            <a:ext cx="8712968" cy="5632311"/>
           </a:xfrm>
           <a:prstGeom prst="rect">
             <a:avLst/>
@@ -5961,7 +6191,7 @@
                   <a:srgbClr val="969696"/>
                 </a:solidFill>
               </a:rPr>
-              <a:t>Testbench</a:t>
+              <a:t>Application</a:t>
             </a:r>
           </a:p>
           <a:p>
@@ -5975,11 +6205,11 @@
                   <a:srgbClr val="969696"/>
                 </a:solidFill>
               </a:rPr>
-              <a:t>Simulation</a:t>
-            </a:r>
-          </a:p>
-          <a:p>
-            <a:pPr marL="914400" lvl="1" indent="-457200">
+              <a:t>Testbench</a:t>
+            </a:r>
+          </a:p>
+          <a:p>
+            <a:pPr marL="457200" indent="-457200">
               <a:buFont typeface="Arial" panose="020B0604020202020204" pitchFamily="34" charset="0"/>
               <a:buChar char="•"/>
             </a:pPr>
@@ -5993,7 +6223,24 @@
             </a:r>
           </a:p>
           <a:p>
-            <a:pPr lvl="1"/>
+            <a:pPr marL="457200" indent="-457200">
+              <a:buFont typeface="Arial" panose="020B0604020202020204" pitchFamily="34" charset="0"/>
+              <a:buChar char="•"/>
+            </a:pPr>
+            <a:r>
+              <a:rPr lang="en-GB" dirty="0">
+                <a:solidFill>
+                  <a:srgbClr val="969696"/>
+                </a:solidFill>
+              </a:rPr>
+              <a:t>Useful Links</a:t>
+            </a:r>
+          </a:p>
+          <a:p>
+            <a:pPr marL="914400" lvl="1" indent="-457200">
+              <a:buFont typeface="Arial" panose="020B0604020202020204" pitchFamily="34" charset="0"/>
+              <a:buChar char="•"/>
+            </a:pPr>
             <a:endParaRPr lang="en-GB" dirty="0">
               <a:solidFill>
                 <a:srgbClr val="969696"/>
@@ -8080,7 +8327,16 @@
             </a:r>
             <a:r>
               <a:rPr lang="en-US" dirty="0"/>
-              <a:t> receive the data </a:t>
+              <a:t> receive the data</a:t>
+            </a:r>
+          </a:p>
+          <a:p>
+            <a:pPr marL="0" indent="0">
+              <a:buNone/>
+            </a:pPr>
+            <a:r>
+              <a:rPr lang="en-US" dirty="0"/>
+              <a:t> </a:t>
             </a:r>
           </a:p>
           <a:p>
@@ -8247,7 +8503,7 @@
           <p:cNvPr id="2" name="Title 1">
             <a:extLst>
               <a:ext uri="{FF2B5EF4-FFF2-40B4-BE49-F238E27FC236}">
-                <a16:creationId xmlns:a16="http://schemas.microsoft.com/office/drawing/2014/main" id="{1C425CC9-6AB3-46AF-B088-CE31185D5114}"/>
+                <a16:creationId xmlns:a16="http://schemas.microsoft.com/office/drawing/2014/main" id="{B9BC88A8-1215-4842-9008-791129A189D2}"/>
               </a:ext>
             </a:extLst>
           </p:cNvPr>
@@ -8265,17 +8521,17 @@
           <a:p>
             <a:r>
               <a:rPr lang="en-US" dirty="0"/>
-              <a:t>Testbench</a:t>
+              <a:t>Application</a:t>
             </a:r>
           </a:p>
         </p:txBody>
       </p:sp>
       <p:pic>
         <p:nvPicPr>
-          <p:cNvPr id="7" name="Content Placeholder 6">
+          <p:cNvPr id="8" name="Content Placeholder 7">
             <a:extLst>
               <a:ext uri="{FF2B5EF4-FFF2-40B4-BE49-F238E27FC236}">
-                <a16:creationId xmlns:a16="http://schemas.microsoft.com/office/drawing/2014/main" id="{3C8173AC-F959-4BB1-87DE-51678896635E}"/>
+                <a16:creationId xmlns:a16="http://schemas.microsoft.com/office/drawing/2014/main" id="{C557F22E-6069-4A3F-9FE3-4B518DEACDED}"/>
               </a:ext>
             </a:extLst>
           </p:cNvPr>
@@ -8294,8 +8550,8 @@
         </p:blipFill>
         <p:spPr>
           <a:xfrm>
-            <a:off x="158386" y="1113847"/>
-            <a:ext cx="8827228" cy="915749"/>
+            <a:off x="0" y="938372"/>
+            <a:ext cx="4648200" cy="5064739"/>
           </a:xfrm>
           <a:prstGeom prst="rect">
             <a:avLst/>
@@ -8307,7 +8563,7 @@
           <p:cNvPr id="5" name="Slide Number Placeholder 4">
             <a:extLst>
               <a:ext uri="{FF2B5EF4-FFF2-40B4-BE49-F238E27FC236}">
-                <a16:creationId xmlns:a16="http://schemas.microsoft.com/office/drawing/2014/main" id="{E5052012-D434-4515-A05A-5B1533CEC4DF}"/>
+                <a16:creationId xmlns:a16="http://schemas.microsoft.com/office/drawing/2014/main" id="{EC802190-4DC8-49B6-B333-0198AC60F408}"/>
               </a:ext>
             </a:extLst>
           </p:cNvPr>
@@ -8342,7 +8598,7 @@
           <p:cNvPr id="6" name="Footer Placeholder 5">
             <a:extLst>
               <a:ext uri="{FF2B5EF4-FFF2-40B4-BE49-F238E27FC236}">
-                <a16:creationId xmlns:a16="http://schemas.microsoft.com/office/drawing/2014/main" id="{9D157A7C-9D5B-402E-AD60-D5C89BD887F4}"/>
+                <a16:creationId xmlns:a16="http://schemas.microsoft.com/office/drawing/2014/main" id="{E03D21CF-AA7B-46FB-B404-5261F34C506A}"/>
               </a:ext>
             </a:extLst>
           </p:cNvPr>
@@ -8368,70 +8624,219 @@
           </a:p>
         </p:txBody>
       </p:sp>
-      <p:pic>
-        <p:nvPicPr>
-          <p:cNvPr id="8" name="Picture 7">
+      <p:sp>
+        <p:nvSpPr>
+          <p:cNvPr id="10" name="Content Placeholder 11">
             <a:extLst>
               <a:ext uri="{FF2B5EF4-FFF2-40B4-BE49-F238E27FC236}">
-                <a16:creationId xmlns:a16="http://schemas.microsoft.com/office/drawing/2014/main" id="{085AAD7F-A04E-436C-A15B-2074AF0035FF}"/>
+                <a16:creationId xmlns:a16="http://schemas.microsoft.com/office/drawing/2014/main" id="{CFAF1387-AB67-4DBA-82AD-BA06C5D2B600}"/>
               </a:ext>
             </a:extLst>
           </p:cNvPr>
-          <p:cNvPicPr>
-            <a:picLocks noChangeAspect="1"/>
-          </p:cNvPicPr>
+          <p:cNvSpPr txBox="1">
+            <a:spLocks/>
+          </p:cNvSpPr>
           <p:nvPr/>
-        </p:nvPicPr>
-        <p:blipFill>
-          <a:blip r:embed="rId3"/>
-          <a:stretch>
-            <a:fillRect/>
-          </a:stretch>
-        </p:blipFill>
-        <p:spPr>
+        </p:nvSpPr>
+        <p:spPr bwMode="auto">
           <a:xfrm>
-            <a:off x="174477" y="2255466"/>
-            <a:ext cx="3970469" cy="3762953"/>
+            <a:off x="4860032" y="938373"/>
+            <a:ext cx="4038600" cy="5064738"/>
           </a:xfrm>
           <a:prstGeom prst="rect">
             <a:avLst/>
           </a:prstGeom>
+          <a:noFill/>
+          <a:ln w="9525">
+            <a:noFill/>
+            <a:miter lim="800000"/>
+            <a:headEnd/>
+            <a:tailEnd/>
+          </a:ln>
         </p:spPr>
-      </p:pic>
-      <p:sp>
-        <p:nvSpPr>
-          <p:cNvPr id="12" name="Content Placeholder 11">
-            <a:extLst>
-              <a:ext uri="{FF2B5EF4-FFF2-40B4-BE49-F238E27FC236}">
-                <a16:creationId xmlns:a16="http://schemas.microsoft.com/office/drawing/2014/main" id="{0003DC4E-DD2C-4D75-B15D-BD99ECC5F7C4}"/>
-              </a:ext>
-            </a:extLst>
-          </p:cNvPr>
-          <p:cNvSpPr>
-            <a:spLocks noGrp="1"/>
-          </p:cNvSpPr>
-          <p:nvPr>
-            <p:ph sz="half" idx="2"/>
-          </p:nvPr>
-        </p:nvSpPr>
-        <p:spPr>
-          <a:xfrm>
-            <a:off x="4659313" y="2132856"/>
-            <a:ext cx="4038600" cy="3932982"/>
-          </a:xfrm>
-        </p:spPr>
-        <p:txBody>
-          <a:bodyPr/>
-          <a:lstStyle/>
-          <a:p>
-            <a:endParaRPr lang="en-US" dirty="0"/>
+        <p:txBody>
+          <a:bodyPr vert="horz" wrap="square" lIns="91440" tIns="45720" rIns="91440" bIns="45720" numCol="1" anchor="t" anchorCtr="0" compatLnSpc="1">
+            <a:prstTxWarp prst="textNoShape">
+              <a:avLst/>
+            </a:prstTxWarp>
+          </a:bodyPr>
+          <a:lstStyle>
+            <a:lvl1pPr marL="342900" indent="-342900" algn="l" rtl="0" eaLnBrk="0" fontAlgn="base" hangingPunct="0">
+              <a:spcBef>
+                <a:spcPct val="20000"/>
+              </a:spcBef>
+              <a:spcAft>
+                <a:spcPct val="0"/>
+              </a:spcAft>
+              <a:buFont typeface="Wingdings" pitchFamily="2" charset="2"/>
+              <a:buChar char="q"/>
+              <a:defRPr sz="2800">
+                <a:solidFill>
+                  <a:srgbClr val="1153B5"/>
+                </a:solidFill>
+                <a:latin typeface="+mn-lt"/>
+                <a:ea typeface="+mn-ea"/>
+                <a:cs typeface="+mn-cs"/>
+              </a:defRPr>
+            </a:lvl1pPr>
+            <a:lvl2pPr marL="742950" indent="-285750" algn="l" rtl="0" eaLnBrk="0" fontAlgn="base" hangingPunct="0">
+              <a:spcBef>
+                <a:spcPct val="20000"/>
+              </a:spcBef>
+              <a:spcAft>
+                <a:spcPct val="0"/>
+              </a:spcAft>
+              <a:buFont typeface="Wingdings" pitchFamily="2" charset="2"/>
+              <a:buChar char="§"/>
+              <a:defRPr sz="2400">
+                <a:solidFill>
+                  <a:srgbClr val="1153B5"/>
+                </a:solidFill>
+                <a:latin typeface="+mn-lt"/>
+              </a:defRPr>
+            </a:lvl2pPr>
+            <a:lvl3pPr marL="1143000" indent="-228600" algn="l" rtl="0" eaLnBrk="0" fontAlgn="base" hangingPunct="0">
+              <a:spcBef>
+                <a:spcPct val="20000"/>
+              </a:spcBef>
+              <a:spcAft>
+                <a:spcPct val="0"/>
+              </a:spcAft>
+              <a:buChar char="•"/>
+              <a:defRPr sz="2000">
+                <a:solidFill>
+                  <a:srgbClr val="1153B5"/>
+                </a:solidFill>
+                <a:latin typeface="+mn-lt"/>
+              </a:defRPr>
+            </a:lvl3pPr>
+            <a:lvl4pPr marL="1600200" indent="-228600" algn="l" rtl="0" eaLnBrk="0" fontAlgn="base" hangingPunct="0">
+              <a:spcBef>
+                <a:spcPct val="20000"/>
+              </a:spcBef>
+              <a:spcAft>
+                <a:spcPct val="0"/>
+              </a:spcAft>
+              <a:buChar char="–"/>
+              <a:defRPr sz="1800">
+                <a:solidFill>
+                  <a:srgbClr val="1153B5"/>
+                </a:solidFill>
+                <a:latin typeface="+mn-lt"/>
+              </a:defRPr>
+            </a:lvl4pPr>
+            <a:lvl5pPr marL="2057400" indent="-228600" algn="l" rtl="0" eaLnBrk="0" fontAlgn="base" hangingPunct="0">
+              <a:spcBef>
+                <a:spcPct val="20000"/>
+              </a:spcBef>
+              <a:spcAft>
+                <a:spcPct val="0"/>
+              </a:spcAft>
+              <a:buChar char="»"/>
+              <a:defRPr sz="1800">
+                <a:solidFill>
+                  <a:srgbClr val="1153B5"/>
+                </a:solidFill>
+                <a:latin typeface="+mn-lt"/>
+              </a:defRPr>
+            </a:lvl5pPr>
+            <a:lvl6pPr marL="2514600" indent="-228600" algn="l" rtl="0" fontAlgn="base">
+              <a:spcBef>
+                <a:spcPct val="20000"/>
+              </a:spcBef>
+              <a:spcAft>
+                <a:spcPct val="0"/>
+              </a:spcAft>
+              <a:buChar char="»"/>
+              <a:defRPr sz="1800">
+                <a:solidFill>
+                  <a:srgbClr val="1153B5"/>
+                </a:solidFill>
+                <a:latin typeface="+mn-lt"/>
+              </a:defRPr>
+            </a:lvl6pPr>
+            <a:lvl7pPr marL="2971800" indent="-228600" algn="l" rtl="0" fontAlgn="base">
+              <a:spcBef>
+                <a:spcPct val="20000"/>
+              </a:spcBef>
+              <a:spcAft>
+                <a:spcPct val="0"/>
+              </a:spcAft>
+              <a:buChar char="»"/>
+              <a:defRPr sz="1800">
+                <a:solidFill>
+                  <a:srgbClr val="1153B5"/>
+                </a:solidFill>
+                <a:latin typeface="+mn-lt"/>
+              </a:defRPr>
+            </a:lvl7pPr>
+            <a:lvl8pPr marL="3429000" indent="-228600" algn="l" rtl="0" fontAlgn="base">
+              <a:spcBef>
+                <a:spcPct val="20000"/>
+              </a:spcBef>
+              <a:spcAft>
+                <a:spcPct val="0"/>
+              </a:spcAft>
+              <a:buChar char="»"/>
+              <a:defRPr sz="1800">
+                <a:solidFill>
+                  <a:srgbClr val="1153B5"/>
+                </a:solidFill>
+                <a:latin typeface="+mn-lt"/>
+              </a:defRPr>
+            </a:lvl8pPr>
+            <a:lvl9pPr marL="3886200" indent="-228600" algn="l" rtl="0" fontAlgn="base">
+              <a:spcBef>
+                <a:spcPct val="20000"/>
+              </a:spcBef>
+              <a:spcAft>
+                <a:spcPct val="0"/>
+              </a:spcAft>
+              <a:buChar char="»"/>
+              <a:defRPr sz="1800">
+                <a:solidFill>
+                  <a:srgbClr val="1153B5"/>
+                </a:solidFill>
+                <a:latin typeface="+mn-lt"/>
+              </a:defRPr>
+            </a:lvl9pPr>
+          </a:lstStyle>
+          <a:p>
+            <a:r>
+              <a:rPr lang="en-US" sz="2200" dirty="0"/>
+              <a:t>The first 4 bits are never used for this device. </a:t>
+            </a:r>
+          </a:p>
+          <a:p>
+            <a:endParaRPr lang="en-US" sz="2200" kern="0" dirty="0"/>
+          </a:p>
+          <a:p>
+            <a:r>
+              <a:rPr lang="en-US" sz="2200" dirty="0"/>
+              <a:t>The last 8 bits each monitor one led in the line. </a:t>
+            </a:r>
+          </a:p>
+          <a:p>
+            <a:endParaRPr lang="en-US" sz="2200" kern="0" dirty="0"/>
+          </a:p>
+          <a:p>
+            <a:r>
+              <a:rPr lang="en-US" sz="2200" dirty="0"/>
+              <a:t>If the bits are equal to 1, the corresponding LEDs will be lit and in the same way, they will be off if the bits are equal to 0.</a:t>
+            </a:r>
+          </a:p>
+          <a:p>
+            <a:endParaRPr lang="en-US" sz="2000" kern="0" dirty="0"/>
+          </a:p>
+          <a:p>
+            <a:endParaRPr lang="en-US" sz="2000" kern="0" dirty="0"/>
           </a:p>
         </p:txBody>
       </p:sp>
     </p:spTree>
     <p:extLst>
       <p:ext uri="{BB962C8B-B14F-4D97-AF65-F5344CB8AC3E}">
-        <p14:creationId xmlns:p14="http://schemas.microsoft.com/office/powerpoint/2010/main" val="2305922971"/>
+        <p14:creationId xmlns:p14="http://schemas.microsoft.com/office/powerpoint/2010/main" val="4010572043"/>
       </p:ext>
     </p:extLst>
   </p:cSld>

</xml_diff>

<commit_message>
Written Report Uploaded and Minor tweaks to Presentation
</commit_message>
<xml_diff>
--- a/Presentation_LEDMatrix.pptx
+++ b/Presentation_LEDMatrix.pptx
@@ -5889,11 +5889,7 @@
             <a:pPr lvl="1"/>
             <a:r>
               <a:rPr lang="en-US" sz="1600" dirty="0"/>
-              <a:t>The Hardware section includes the wiring proposed by us just by looking at the characteristics of the board and the LED Matrix </a:t>
-            </a:r>
-            <a:r>
-              <a:rPr lang="en-US" sz="1600"/>
-              <a:t>online.</a:t>
+              <a:t>The Hardware section includes the wiring proposed by us just by looking at the characteristics of the board and the LED Matrix online.</a:t>
             </a:r>
             <a:endParaRPr lang="en-US" sz="2000" dirty="0"/>
           </a:p>

</xml_diff>